<commit_message>
Worked on game and presentation
</commit_message>
<xml_diff>
--- a/Presentations/Group 14 Pitch Beta.pptx
+++ b/Presentations/Group 14 Pitch Beta.pptx
@@ -12,11 +12,11 @@
     <p:sldId id="274" r:id="rId3"/>
     <p:sldId id="258" r:id="rId4"/>
     <p:sldId id="275" r:id="rId5"/>
-    <p:sldId id="261" r:id="rId6"/>
-    <p:sldId id="262" r:id="rId7"/>
-    <p:sldId id="266" r:id="rId8"/>
-    <p:sldId id="259" r:id="rId9"/>
-    <p:sldId id="281" r:id="rId10"/>
+    <p:sldId id="282" r:id="rId6"/>
+    <p:sldId id="261" r:id="rId7"/>
+    <p:sldId id="262" r:id="rId8"/>
+    <p:sldId id="266" r:id="rId9"/>
+    <p:sldId id="259" r:id="rId10"/>
     <p:sldId id="280" r:id="rId11"/>
     <p:sldId id="267" r:id="rId12"/>
     <p:sldId id="268" r:id="rId13"/>
@@ -208,7 +208,7 @@
           <a:p>
             <a:fld id="{77C6FF30-EFD7-4437-901C-DE7AE577CC7B}" type="datetimeFigureOut">
               <a:rPr lang="en-GB" smtClean="0"/>
-              <a:t>16/04/2018</a:t>
+              <a:t>17/04/2018</a:t>
             </a:fld>
             <a:endParaRPr lang="en-GB"/>
           </a:p>
@@ -1635,7 +1635,7 @@
           <a:p>
             <a:fld id="{0FA91835-90FF-41E4-AF94-16E4E0C00F06}" type="slidenum">
               <a:rPr lang="en-GB" smtClean="0"/>
-              <a:t>5</a:t>
+              <a:t>6</a:t>
             </a:fld>
             <a:endParaRPr lang="en-GB"/>
           </a:p>
@@ -1719,7 +1719,7 @@
           <a:p>
             <a:fld id="{0FA91835-90FF-41E4-AF94-16E4E0C00F06}" type="slidenum">
               <a:rPr lang="en-GB" smtClean="0"/>
-              <a:t>6</a:t>
+              <a:t>7</a:t>
             </a:fld>
             <a:endParaRPr lang="en-GB"/>
           </a:p>
@@ -1834,7 +1834,7 @@
           <a:p>
             <a:fld id="{0FA91835-90FF-41E4-AF94-16E4E0C00F06}" type="slidenum">
               <a:rPr lang="en-GB" smtClean="0"/>
-              <a:t>7</a:t>
+              <a:t>8</a:t>
             </a:fld>
             <a:endParaRPr lang="en-GB"/>
           </a:p>
@@ -1918,7 +1918,7 @@
           <a:p>
             <a:fld id="{0FA91835-90FF-41E4-AF94-16E4E0C00F06}" type="slidenum">
               <a:rPr lang="en-GB" smtClean="0"/>
-              <a:t>8</a:t>
+              <a:t>9</a:t>
             </a:fld>
             <a:endParaRPr lang="en-GB"/>
           </a:p>
@@ -2303,7 +2303,7 @@
           <a:p>
             <a:fld id="{F9B79F2D-3A05-4848-97F8-7B346024FD0C}" type="datetimeFigureOut">
               <a:rPr lang="en-GB" smtClean="0"/>
-              <a:t>16/04/2018</a:t>
+              <a:t>17/04/2018</a:t>
             </a:fld>
             <a:endParaRPr lang="en-GB"/>
           </a:p>
@@ -2578,7 +2578,7 @@
           <a:p>
             <a:fld id="{F9B79F2D-3A05-4848-97F8-7B346024FD0C}" type="datetimeFigureOut">
               <a:rPr lang="en-GB" smtClean="0"/>
-              <a:t>16/04/2018</a:t>
+              <a:t>17/04/2018</a:t>
             </a:fld>
             <a:endParaRPr lang="en-GB"/>
           </a:p>
@@ -2772,7 +2772,7 @@
           <a:p>
             <a:fld id="{F9B79F2D-3A05-4848-97F8-7B346024FD0C}" type="datetimeFigureOut">
               <a:rPr lang="en-GB" smtClean="0"/>
-              <a:t>16/04/2018</a:t>
+              <a:t>17/04/2018</a:t>
             </a:fld>
             <a:endParaRPr lang="en-GB"/>
           </a:p>
@@ -3045,7 +3045,7 @@
           <a:p>
             <a:fld id="{F9B79F2D-3A05-4848-97F8-7B346024FD0C}" type="datetimeFigureOut">
               <a:rPr lang="en-GB" smtClean="0"/>
-              <a:t>16/04/2018</a:t>
+              <a:t>17/04/2018</a:t>
             </a:fld>
             <a:endParaRPr lang="en-GB"/>
           </a:p>
@@ -3386,7 +3386,7 @@
           <a:p>
             <a:fld id="{F9B79F2D-3A05-4848-97F8-7B346024FD0C}" type="datetimeFigureOut">
               <a:rPr lang="en-GB" smtClean="0"/>
-              <a:t>16/04/2018</a:t>
+              <a:t>17/04/2018</a:t>
             </a:fld>
             <a:endParaRPr lang="en-GB"/>
           </a:p>
@@ -4009,7 +4009,7 @@
           <a:p>
             <a:fld id="{F9B79F2D-3A05-4848-97F8-7B346024FD0C}" type="datetimeFigureOut">
               <a:rPr lang="en-GB" smtClean="0"/>
-              <a:t>16/04/2018</a:t>
+              <a:t>17/04/2018</a:t>
             </a:fld>
             <a:endParaRPr lang="en-GB"/>
           </a:p>
@@ -4869,7 +4869,7 @@
           <a:p>
             <a:fld id="{F9B79F2D-3A05-4848-97F8-7B346024FD0C}" type="datetimeFigureOut">
               <a:rPr lang="en-GB" smtClean="0"/>
-              <a:t>16/04/2018</a:t>
+              <a:t>17/04/2018</a:t>
             </a:fld>
             <a:endParaRPr lang="en-GB"/>
           </a:p>
@@ -5039,7 +5039,7 @@
           <a:p>
             <a:fld id="{F9B79F2D-3A05-4848-97F8-7B346024FD0C}" type="datetimeFigureOut">
               <a:rPr lang="en-GB" smtClean="0"/>
-              <a:t>16/04/2018</a:t>
+              <a:t>17/04/2018</a:t>
             </a:fld>
             <a:endParaRPr lang="en-GB"/>
           </a:p>
@@ -5219,7 +5219,7 @@
           <a:p>
             <a:fld id="{F9B79F2D-3A05-4848-97F8-7B346024FD0C}" type="datetimeFigureOut">
               <a:rPr lang="en-GB" smtClean="0"/>
-              <a:t>16/04/2018</a:t>
+              <a:t>17/04/2018</a:t>
             </a:fld>
             <a:endParaRPr lang="en-GB"/>
           </a:p>
@@ -5389,7 +5389,7 @@
           <a:p>
             <a:fld id="{F9B79F2D-3A05-4848-97F8-7B346024FD0C}" type="datetimeFigureOut">
               <a:rPr lang="en-GB" smtClean="0"/>
-              <a:t>16/04/2018</a:t>
+              <a:t>17/04/2018</a:t>
             </a:fld>
             <a:endParaRPr lang="en-GB"/>
           </a:p>
@@ -5636,7 +5636,7 @@
           <a:p>
             <a:fld id="{F9B79F2D-3A05-4848-97F8-7B346024FD0C}" type="datetimeFigureOut">
               <a:rPr lang="en-GB" smtClean="0"/>
-              <a:t>16/04/2018</a:t>
+              <a:t>17/04/2018</a:t>
             </a:fld>
             <a:endParaRPr lang="en-GB"/>
           </a:p>
@@ -5928,7 +5928,7 @@
           <a:p>
             <a:fld id="{F9B79F2D-3A05-4848-97F8-7B346024FD0C}" type="datetimeFigureOut">
               <a:rPr lang="en-GB" smtClean="0"/>
-              <a:t>16/04/2018</a:t>
+              <a:t>17/04/2018</a:t>
             </a:fld>
             <a:endParaRPr lang="en-GB"/>
           </a:p>
@@ -6372,7 +6372,7 @@
           <a:p>
             <a:fld id="{F9B79F2D-3A05-4848-97F8-7B346024FD0C}" type="datetimeFigureOut">
               <a:rPr lang="en-GB" smtClean="0"/>
-              <a:t>16/04/2018</a:t>
+              <a:t>17/04/2018</a:t>
             </a:fld>
             <a:endParaRPr lang="en-GB"/>
           </a:p>
@@ -6490,7 +6490,7 @@
           <a:p>
             <a:fld id="{F9B79F2D-3A05-4848-97F8-7B346024FD0C}" type="datetimeFigureOut">
               <a:rPr lang="en-GB" smtClean="0"/>
-              <a:t>16/04/2018</a:t>
+              <a:t>17/04/2018</a:t>
             </a:fld>
             <a:endParaRPr lang="en-GB"/>
           </a:p>
@@ -6585,7 +6585,7 @@
           <a:p>
             <a:fld id="{F9B79F2D-3A05-4848-97F8-7B346024FD0C}" type="datetimeFigureOut">
               <a:rPr lang="en-GB" smtClean="0"/>
-              <a:t>16/04/2018</a:t>
+              <a:t>17/04/2018</a:t>
             </a:fld>
             <a:endParaRPr lang="en-GB"/>
           </a:p>
@@ -6864,7 +6864,7 @@
           <a:p>
             <a:fld id="{F9B79F2D-3A05-4848-97F8-7B346024FD0C}" type="datetimeFigureOut">
               <a:rPr lang="en-GB" smtClean="0"/>
-              <a:t>16/04/2018</a:t>
+              <a:t>17/04/2018</a:t>
             </a:fld>
             <a:endParaRPr lang="en-GB"/>
           </a:p>
@@ -7139,7 +7139,7 @@
           <a:p>
             <a:fld id="{F9B79F2D-3A05-4848-97F8-7B346024FD0C}" type="datetimeFigureOut">
               <a:rPr lang="en-GB" smtClean="0"/>
-              <a:t>16/04/2018</a:t>
+              <a:t>17/04/2018</a:t>
             </a:fld>
             <a:endParaRPr lang="en-GB"/>
           </a:p>
@@ -7568,7 +7568,7 @@
           <a:p>
             <a:fld id="{F9B79F2D-3A05-4848-97F8-7B346024FD0C}" type="datetimeFigureOut">
               <a:rPr lang="en-GB" smtClean="0"/>
-              <a:t>16/04/2018</a:t>
+              <a:t>17/04/2018</a:t>
             </a:fld>
             <a:endParaRPr lang="en-GB"/>
           </a:p>
@@ -9793,7 +9793,7 @@
           <a:p>
             <a:r>
               <a:rPr lang="en-GB" dirty="0"/>
-              <a:t>E</a:t>
+              <a:t>T</a:t>
             </a:r>
           </a:p>
         </p:txBody>
@@ -9983,7 +9983,7 @@
           <a:p>
             <a:r>
               <a:rPr lang="en-GB" dirty="0"/>
-              <a:t>T</a:t>
+              <a:t>E</a:t>
             </a:r>
           </a:p>
         </p:txBody>
@@ -10067,7 +10067,7 @@
           <p:cNvPr id="2" name="Title 1">
             <a:extLst>
               <a:ext uri="{FF2B5EF4-FFF2-40B4-BE49-F238E27FC236}">
-                <a16:creationId xmlns:a16="http://schemas.microsoft.com/office/drawing/2014/main" id="{2A6C51B4-F8AB-4319-8469-886E389188DE}"/>
+                <a16:creationId xmlns:a16="http://schemas.microsoft.com/office/drawing/2014/main" id="{440F948B-1DED-470B-BD41-F3D12FA50A03}"/>
               </a:ext>
             </a:extLst>
           </p:cNvPr>
@@ -10078,82 +10078,69 @@
             <p:ph type="title"/>
           </p:nvPr>
         </p:nvSpPr>
-        <p:spPr>
-          <a:xfrm>
-            <a:off x="646111" y="452718"/>
-            <a:ext cx="9404723" cy="839053"/>
-          </a:xfrm>
-        </p:spPr>
+        <p:spPr/>
         <p:txBody>
           <a:bodyPr/>
           <a:lstStyle/>
           <a:p>
-            <a:r>
-              <a:rPr lang="en-GB" dirty="0"/>
-              <a:t>What does the player do?</a:t>
-            </a:r>
-          </a:p>
-        </p:txBody>
-      </p:sp>
-      <p:sp>
-        <p:nvSpPr>
-          <p:cNvPr id="4" name="TextBox 3">
+            <a:endParaRPr lang="en-GB"/>
+          </a:p>
+        </p:txBody>
+      </p:sp>
+      <p:sp>
+        <p:nvSpPr>
+          <p:cNvPr id="3" name="Content Placeholder 2">
             <a:extLst>
               <a:ext uri="{FF2B5EF4-FFF2-40B4-BE49-F238E27FC236}">
-                <a16:creationId xmlns:a16="http://schemas.microsoft.com/office/drawing/2014/main" id="{5C89ADB2-DB96-4FDA-909F-906186794C7E}"/>
+                <a16:creationId xmlns:a16="http://schemas.microsoft.com/office/drawing/2014/main" id="{5DF38C7E-78E6-401F-8198-48088BB2B5E3}"/>
               </a:ext>
             </a:extLst>
           </p:cNvPr>
-          <p:cNvSpPr txBox="1"/>
-          <p:nvPr/>
-        </p:nvSpPr>
-        <p:spPr>
-          <a:xfrm>
-            <a:off x="10610850" y="452718"/>
-            <a:ext cx="342900" cy="369332"/>
-          </a:xfrm>
-          <a:prstGeom prst="rect">
-            <a:avLst/>
-          </a:prstGeom>
-          <a:noFill/>
-        </p:spPr>
-        <p:txBody>
-          <a:bodyPr wrap="square" rtlCol="0">
-            <a:spAutoFit/>
-          </a:bodyPr>
+          <p:cNvSpPr>
+            <a:spLocks noGrp="1"/>
+          </p:cNvSpPr>
+          <p:nvPr>
+            <p:ph idx="1"/>
+          </p:nvPr>
+        </p:nvSpPr>
+        <p:spPr/>
+        <p:txBody>
+          <a:bodyPr/>
           <a:lstStyle/>
           <a:p>
             <a:r>
               <a:rPr lang="en-GB" dirty="0"/>
-              <a:t>P</a:t>
-            </a:r>
-          </a:p>
-        </p:txBody>
-      </p:sp>
-      <p:sp>
-        <p:nvSpPr>
-          <p:cNvPr id="6" name="Content Placeholder 5">
-            <a:extLst>
-              <a:ext uri="{FF2B5EF4-FFF2-40B4-BE49-F238E27FC236}">
-                <a16:creationId xmlns:a16="http://schemas.microsoft.com/office/drawing/2014/main" id="{49367D90-46FD-42CF-86AF-2C69B2F29DA3}"/>
-              </a:ext>
-            </a:extLst>
-          </p:cNvPr>
-          <p:cNvSpPr>
-            <a:spLocks noGrp="1"/>
-          </p:cNvSpPr>
-          <p:nvPr>
-            <p:ph idx="1"/>
-          </p:nvPr>
-        </p:nvSpPr>
-        <p:spPr/>
-        <p:txBody>
-          <a:bodyPr/>
-          <a:lstStyle/>
+              <a:t>Health bar</a:t>
+            </a:r>
+          </a:p>
           <a:p>
             <a:r>
               <a:rPr lang="en-GB" dirty="0"/>
-              <a:t>Insert Video here</a:t>
+              <a:t>Only 4 buttons</a:t>
+            </a:r>
+          </a:p>
+          <a:p>
+            <a:r>
+              <a:rPr lang="en-GB" dirty="0"/>
+              <a:t>Hit and miss</a:t>
+            </a:r>
+          </a:p>
+          <a:p>
+            <a:r>
+              <a:rPr lang="en-GB" dirty="0"/>
+              <a:t>Player turn</a:t>
+            </a:r>
+          </a:p>
+          <a:p>
+            <a:r>
+              <a:rPr lang="en-GB" dirty="0"/>
+              <a:t>Visual Hierarchy</a:t>
+            </a:r>
+          </a:p>
+          <a:p>
+            <a:r>
+              <a:rPr lang="en-GB" dirty="0"/>
+              <a:t>Meaningful choice </a:t>
             </a:r>
           </a:p>
         </p:txBody>
@@ -10161,7 +10148,7 @@
     </p:spTree>
     <p:extLst>
       <p:ext uri="{BB962C8B-B14F-4D97-AF65-F5344CB8AC3E}">
-        <p14:creationId xmlns:p14="http://schemas.microsoft.com/office/powerpoint/2010/main" val="2234175574"/>
+        <p14:creationId xmlns:p14="http://schemas.microsoft.com/office/powerpoint/2010/main" val="3336463341"/>
       </p:ext>
     </p:extLst>
   </p:cSld>
@@ -10193,7 +10180,7 @@
           <p:cNvPr id="2" name="Title 1">
             <a:extLst>
               <a:ext uri="{FF2B5EF4-FFF2-40B4-BE49-F238E27FC236}">
-                <a16:creationId xmlns:a16="http://schemas.microsoft.com/office/drawing/2014/main" id="{B6FD9CEF-C4EB-4584-B49F-A02E873D6779}"/>
+                <a16:creationId xmlns:a16="http://schemas.microsoft.com/office/drawing/2014/main" id="{2A6C51B4-F8AB-4319-8469-886E389188DE}"/>
               </a:ext>
             </a:extLst>
           </p:cNvPr>
@@ -10204,89 +10191,19 @@
             <p:ph type="title"/>
           </p:nvPr>
         </p:nvSpPr>
-        <p:spPr/>
+        <p:spPr>
+          <a:xfrm>
+            <a:off x="646111" y="452718"/>
+            <a:ext cx="9404723" cy="839053"/>
+          </a:xfrm>
+        </p:spPr>
         <p:txBody>
           <a:bodyPr/>
           <a:lstStyle/>
           <a:p>
             <a:r>
               <a:rPr lang="en-GB" dirty="0"/>
-              <a:t>Mechanics: </a:t>
-            </a:r>
-          </a:p>
-        </p:txBody>
-      </p:sp>
-      <p:sp>
-        <p:nvSpPr>
-          <p:cNvPr id="3" name="Content Placeholder 2">
-            <a:extLst>
-              <a:ext uri="{FF2B5EF4-FFF2-40B4-BE49-F238E27FC236}">
-                <a16:creationId xmlns:a16="http://schemas.microsoft.com/office/drawing/2014/main" id="{631A7050-10F3-4ED1-991E-B2AA17989DB6}"/>
-              </a:ext>
-            </a:extLst>
-          </p:cNvPr>
-          <p:cNvSpPr>
-            <a:spLocks noGrp="1"/>
-          </p:cNvSpPr>
-          <p:nvPr>
-            <p:ph idx="1"/>
-          </p:nvPr>
-        </p:nvSpPr>
-        <p:spPr/>
-        <p:txBody>
-          <a:bodyPr>
-            <a:normAutofit/>
-          </a:bodyPr>
-          <a:lstStyle/>
-          <a:p>
-            <a:pPr marL="0" indent="0" algn="ctr">
-              <a:buNone/>
-            </a:pPr>
-            <a:r>
-              <a:rPr lang="en-GB" sz="3600" dirty="0"/>
-              <a:t>Attack</a:t>
-            </a:r>
-          </a:p>
-          <a:p>
-            <a:pPr marL="0" indent="0" algn="ctr">
-              <a:buNone/>
-            </a:pPr>
-            <a:r>
-              <a:rPr lang="en-GB" sz="3600" dirty="0"/>
-              <a:t>Dodge</a:t>
-            </a:r>
-          </a:p>
-          <a:p>
-            <a:pPr marL="0" indent="0" algn="ctr">
-              <a:buNone/>
-            </a:pPr>
-            <a:r>
-              <a:rPr lang="en-GB" sz="3600" dirty="0"/>
-              <a:t>Speed up</a:t>
-            </a:r>
-          </a:p>
-          <a:p>
-            <a:pPr marL="0" indent="0" algn="ctr">
-              <a:buNone/>
-            </a:pPr>
-            <a:r>
-              <a:rPr lang="en-GB" sz="3600" dirty="0"/>
-              <a:t>Heal</a:t>
-            </a:r>
-          </a:p>
-          <a:p>
-            <a:pPr marL="0" indent="0" algn="ctr">
-              <a:buNone/>
-            </a:pPr>
-            <a:endParaRPr lang="en-GB" sz="3600" dirty="0"/>
-          </a:p>
-          <a:p>
-            <a:pPr marL="0" indent="0" algn="ctr">
-              <a:buNone/>
-            </a:pPr>
-            <a:r>
-              <a:rPr lang="en-GB" sz="3600" dirty="0"/>
-              <a:t>Pendulum</a:t>
+              <a:t>What does the player do?</a:t>
             </a:r>
           </a:p>
         </p:txBody>
@@ -10296,7 +10213,7 @@
           <p:cNvPr id="4" name="TextBox 3">
             <a:extLst>
               <a:ext uri="{FF2B5EF4-FFF2-40B4-BE49-F238E27FC236}">
-                <a16:creationId xmlns:a16="http://schemas.microsoft.com/office/drawing/2014/main" id="{F6E057A5-D628-4E7B-B7C3-E0DBA1EC1350}"/>
+                <a16:creationId xmlns:a16="http://schemas.microsoft.com/office/drawing/2014/main" id="{5C89ADB2-DB96-4FDA-909F-906186794C7E}"/>
               </a:ext>
             </a:extLst>
           </p:cNvPr>
@@ -10326,10 +10243,38 @@
           </a:p>
         </p:txBody>
       </p:sp>
+      <p:sp>
+        <p:nvSpPr>
+          <p:cNvPr id="6" name="Content Placeholder 5">
+            <a:extLst>
+              <a:ext uri="{FF2B5EF4-FFF2-40B4-BE49-F238E27FC236}">
+                <a16:creationId xmlns:a16="http://schemas.microsoft.com/office/drawing/2014/main" id="{49367D90-46FD-42CF-86AF-2C69B2F29DA3}"/>
+              </a:ext>
+            </a:extLst>
+          </p:cNvPr>
+          <p:cNvSpPr>
+            <a:spLocks noGrp="1"/>
+          </p:cNvSpPr>
+          <p:nvPr>
+            <p:ph idx="1"/>
+          </p:nvPr>
+        </p:nvSpPr>
+        <p:spPr/>
+        <p:txBody>
+          <a:bodyPr/>
+          <a:lstStyle/>
+          <a:p>
+            <a:r>
+              <a:rPr lang="en-GB" dirty="0"/>
+              <a:t>Insert Video here</a:t>
+            </a:r>
+          </a:p>
+        </p:txBody>
+      </p:sp>
     </p:spTree>
     <p:extLst>
       <p:ext uri="{BB962C8B-B14F-4D97-AF65-F5344CB8AC3E}">
-        <p14:creationId xmlns:p14="http://schemas.microsoft.com/office/powerpoint/2010/main" val="345086452"/>
+        <p14:creationId xmlns:p14="http://schemas.microsoft.com/office/powerpoint/2010/main" val="2234175574"/>
       </p:ext>
     </p:extLst>
   </p:cSld>
@@ -10361,6 +10306,174 @@
           <p:cNvPr id="2" name="Title 1">
             <a:extLst>
               <a:ext uri="{FF2B5EF4-FFF2-40B4-BE49-F238E27FC236}">
+                <a16:creationId xmlns:a16="http://schemas.microsoft.com/office/drawing/2014/main" id="{B6FD9CEF-C4EB-4584-B49F-A02E873D6779}"/>
+              </a:ext>
+            </a:extLst>
+          </p:cNvPr>
+          <p:cNvSpPr>
+            <a:spLocks noGrp="1"/>
+          </p:cNvSpPr>
+          <p:nvPr>
+            <p:ph type="title"/>
+          </p:nvPr>
+        </p:nvSpPr>
+        <p:spPr/>
+        <p:txBody>
+          <a:bodyPr/>
+          <a:lstStyle/>
+          <a:p>
+            <a:r>
+              <a:rPr lang="en-GB" dirty="0"/>
+              <a:t>Mechanics: </a:t>
+            </a:r>
+          </a:p>
+        </p:txBody>
+      </p:sp>
+      <p:sp>
+        <p:nvSpPr>
+          <p:cNvPr id="3" name="Content Placeholder 2">
+            <a:extLst>
+              <a:ext uri="{FF2B5EF4-FFF2-40B4-BE49-F238E27FC236}">
+                <a16:creationId xmlns:a16="http://schemas.microsoft.com/office/drawing/2014/main" id="{631A7050-10F3-4ED1-991E-B2AA17989DB6}"/>
+              </a:ext>
+            </a:extLst>
+          </p:cNvPr>
+          <p:cNvSpPr>
+            <a:spLocks noGrp="1"/>
+          </p:cNvSpPr>
+          <p:nvPr>
+            <p:ph idx="1"/>
+          </p:nvPr>
+        </p:nvSpPr>
+        <p:spPr/>
+        <p:txBody>
+          <a:bodyPr>
+            <a:normAutofit/>
+          </a:bodyPr>
+          <a:lstStyle/>
+          <a:p>
+            <a:pPr marL="0" indent="0" algn="ctr">
+              <a:buNone/>
+            </a:pPr>
+            <a:r>
+              <a:rPr lang="en-GB" sz="3600" dirty="0"/>
+              <a:t>Attack</a:t>
+            </a:r>
+          </a:p>
+          <a:p>
+            <a:pPr marL="0" indent="0" algn="ctr">
+              <a:buNone/>
+            </a:pPr>
+            <a:r>
+              <a:rPr lang="en-GB" sz="3600" dirty="0"/>
+              <a:t>Dodge</a:t>
+            </a:r>
+          </a:p>
+          <a:p>
+            <a:pPr marL="0" indent="0" algn="ctr">
+              <a:buNone/>
+            </a:pPr>
+            <a:r>
+              <a:rPr lang="en-GB" sz="3600" dirty="0"/>
+              <a:t>Speed up</a:t>
+            </a:r>
+          </a:p>
+          <a:p>
+            <a:pPr marL="0" indent="0" algn="ctr">
+              <a:buNone/>
+            </a:pPr>
+            <a:r>
+              <a:rPr lang="en-GB" sz="3600" dirty="0"/>
+              <a:t>Heal</a:t>
+            </a:r>
+          </a:p>
+          <a:p>
+            <a:pPr marL="0" indent="0" algn="ctr">
+              <a:buNone/>
+            </a:pPr>
+            <a:endParaRPr lang="en-GB" sz="3600" dirty="0"/>
+          </a:p>
+          <a:p>
+            <a:pPr marL="0" indent="0" algn="ctr">
+              <a:buNone/>
+            </a:pPr>
+            <a:r>
+              <a:rPr lang="en-GB" sz="3600" dirty="0"/>
+              <a:t>Pendulum</a:t>
+            </a:r>
+          </a:p>
+        </p:txBody>
+      </p:sp>
+      <p:sp>
+        <p:nvSpPr>
+          <p:cNvPr id="4" name="TextBox 3">
+            <a:extLst>
+              <a:ext uri="{FF2B5EF4-FFF2-40B4-BE49-F238E27FC236}">
+                <a16:creationId xmlns:a16="http://schemas.microsoft.com/office/drawing/2014/main" id="{F6E057A5-D628-4E7B-B7C3-E0DBA1EC1350}"/>
+              </a:ext>
+            </a:extLst>
+          </p:cNvPr>
+          <p:cNvSpPr txBox="1"/>
+          <p:nvPr/>
+        </p:nvSpPr>
+        <p:spPr>
+          <a:xfrm>
+            <a:off x="10610850" y="452718"/>
+            <a:ext cx="342900" cy="369332"/>
+          </a:xfrm>
+          <a:prstGeom prst="rect">
+            <a:avLst/>
+          </a:prstGeom>
+          <a:noFill/>
+        </p:spPr>
+        <p:txBody>
+          <a:bodyPr wrap="square" rtlCol="0">
+            <a:spAutoFit/>
+          </a:bodyPr>
+          <a:lstStyle/>
+          <a:p>
+            <a:r>
+              <a:rPr lang="en-GB" dirty="0"/>
+              <a:t>P</a:t>
+            </a:r>
+          </a:p>
+        </p:txBody>
+      </p:sp>
+    </p:spTree>
+    <p:extLst>
+      <p:ext uri="{BB962C8B-B14F-4D97-AF65-F5344CB8AC3E}">
+        <p14:creationId xmlns:p14="http://schemas.microsoft.com/office/powerpoint/2010/main" val="345086452"/>
+      </p:ext>
+    </p:extLst>
+  </p:cSld>
+  <p:clrMapOvr>
+    <a:masterClrMapping/>
+  </p:clrMapOvr>
+</p:sld>
+</file>
+
+<file path=ppt/slides/slide8.xml><?xml version="1.0" encoding="utf-8"?>
+<p:sld xmlns:a="http://schemas.openxmlformats.org/drawingml/2006/main" xmlns:r="http://schemas.openxmlformats.org/officeDocument/2006/relationships" xmlns:p="http://schemas.openxmlformats.org/presentationml/2006/main">
+  <p:cSld>
+    <p:spTree>
+      <p:nvGrpSpPr>
+        <p:cNvPr id="1" name=""/>
+        <p:cNvGrpSpPr/>
+        <p:nvPr/>
+      </p:nvGrpSpPr>
+      <p:grpSpPr>
+        <a:xfrm>
+          <a:off x="0" y="0"/>
+          <a:ext cx="0" cy="0"/>
+          <a:chOff x="0" y="0"/>
+          <a:chExt cx="0" cy="0"/>
+        </a:xfrm>
+      </p:grpSpPr>
+      <p:sp>
+        <p:nvSpPr>
+          <p:cNvPr id="2" name="Title 1">
+            <a:extLst>
+              <a:ext uri="{FF2B5EF4-FFF2-40B4-BE49-F238E27FC236}">
                 <a16:creationId xmlns:a16="http://schemas.microsoft.com/office/drawing/2014/main" id="{FE35A943-83D0-4753-AA1C-4A6833FF9B39}"/>
               </a:ext>
             </a:extLst>
@@ -10437,12 +10550,6 @@
             <a:r>
               <a:rPr lang="en-GB" sz="3000" dirty="0"/>
               <a:t> People Fun.</a:t>
-            </a:r>
-          </a:p>
-          <a:p>
-            <a:r>
-              <a:rPr lang="en-GB" sz="3000" dirty="0"/>
-              <a:t> Hard Fun.</a:t>
             </a:r>
           </a:p>
         </p:txBody>
@@ -10714,148 +10821,6 @@
 </p:sld>
 </file>
 
-<file path=ppt/slides/slide8.xml><?xml version="1.0" encoding="utf-8"?>
-<p:sld xmlns:a="http://schemas.openxmlformats.org/drawingml/2006/main" xmlns:r="http://schemas.openxmlformats.org/officeDocument/2006/relationships" xmlns:p="http://schemas.openxmlformats.org/presentationml/2006/main">
-  <p:cSld>
-    <p:spTree>
-      <p:nvGrpSpPr>
-        <p:cNvPr id="1" name=""/>
-        <p:cNvGrpSpPr/>
-        <p:nvPr/>
-      </p:nvGrpSpPr>
-      <p:grpSpPr>
-        <a:xfrm>
-          <a:off x="0" y="0"/>
-          <a:ext cx="0" cy="0"/>
-          <a:chOff x="0" y="0"/>
-          <a:chExt cx="0" cy="0"/>
-        </a:xfrm>
-      </p:grpSpPr>
-      <p:sp>
-        <p:nvSpPr>
-          <p:cNvPr id="2" name="Title 1">
-            <a:extLst>
-              <a:ext uri="{FF2B5EF4-FFF2-40B4-BE49-F238E27FC236}">
-                <a16:creationId xmlns:a16="http://schemas.microsoft.com/office/drawing/2014/main" id="{B800E62F-782F-4ACF-883E-C01DCFC56AA2}"/>
-              </a:ext>
-            </a:extLst>
-          </p:cNvPr>
-          <p:cNvSpPr>
-            <a:spLocks noGrp="1"/>
-          </p:cNvSpPr>
-          <p:nvPr>
-            <p:ph type="title"/>
-          </p:nvPr>
-        </p:nvSpPr>
-        <p:spPr/>
-        <p:txBody>
-          <a:bodyPr/>
-          <a:lstStyle/>
-          <a:p>
-            <a:r>
-              <a:rPr lang="en-GB" dirty="0"/>
-              <a:t>What are the games challenges?</a:t>
-            </a:r>
-          </a:p>
-        </p:txBody>
-      </p:sp>
-      <p:sp>
-        <p:nvSpPr>
-          <p:cNvPr id="3" name="Content Placeholder 2">
-            <a:extLst>
-              <a:ext uri="{FF2B5EF4-FFF2-40B4-BE49-F238E27FC236}">
-                <a16:creationId xmlns:a16="http://schemas.microsoft.com/office/drawing/2014/main" id="{BC1716B1-6E25-4E8D-9760-7F764FFC262B}"/>
-              </a:ext>
-            </a:extLst>
-          </p:cNvPr>
-          <p:cNvSpPr>
-            <a:spLocks noGrp="1"/>
-          </p:cNvSpPr>
-          <p:nvPr>
-            <p:ph idx="1"/>
-          </p:nvPr>
-        </p:nvSpPr>
-        <p:spPr/>
-        <p:txBody>
-          <a:bodyPr>
-            <a:normAutofit/>
-          </a:bodyPr>
-          <a:lstStyle/>
-          <a:p>
-            <a:r>
-              <a:rPr lang="en-GB" sz="3200" dirty="0"/>
-              <a:t>Social</a:t>
-            </a:r>
-          </a:p>
-          <a:p>
-            <a:r>
-              <a:rPr lang="en-GB" sz="3200" dirty="0"/>
-              <a:t>Strategical</a:t>
-            </a:r>
-          </a:p>
-          <a:p>
-            <a:r>
-              <a:rPr lang="en-GB" sz="3200" dirty="0"/>
-              <a:t>Physical challenge</a:t>
-            </a:r>
-          </a:p>
-          <a:p>
-            <a:pPr lvl="1"/>
-            <a:r>
-              <a:rPr lang="en-GB" sz="3000" dirty="0"/>
-              <a:t>Twitch mechanic</a:t>
-            </a:r>
-          </a:p>
-        </p:txBody>
-      </p:sp>
-      <p:sp>
-        <p:nvSpPr>
-          <p:cNvPr id="4" name="TextBox 3">
-            <a:extLst>
-              <a:ext uri="{FF2B5EF4-FFF2-40B4-BE49-F238E27FC236}">
-                <a16:creationId xmlns:a16="http://schemas.microsoft.com/office/drawing/2014/main" id="{92D77B54-0290-4018-9D3E-40407F07D633}"/>
-              </a:ext>
-            </a:extLst>
-          </p:cNvPr>
-          <p:cNvSpPr txBox="1"/>
-          <p:nvPr/>
-        </p:nvSpPr>
-        <p:spPr>
-          <a:xfrm>
-            <a:off x="10610850" y="452718"/>
-            <a:ext cx="342900" cy="369332"/>
-          </a:xfrm>
-          <a:prstGeom prst="rect">
-            <a:avLst/>
-          </a:prstGeom>
-          <a:noFill/>
-        </p:spPr>
-        <p:txBody>
-          <a:bodyPr wrap="square" rtlCol="0">
-            <a:spAutoFit/>
-          </a:bodyPr>
-          <a:lstStyle/>
-          <a:p>
-            <a:r>
-              <a:rPr lang="en-GB" dirty="0"/>
-              <a:t>T</a:t>
-            </a:r>
-          </a:p>
-        </p:txBody>
-      </p:sp>
-    </p:spTree>
-    <p:extLst>
-      <p:ext uri="{BB962C8B-B14F-4D97-AF65-F5344CB8AC3E}">
-        <p14:creationId xmlns:p14="http://schemas.microsoft.com/office/powerpoint/2010/main" val="1743628887"/>
-      </p:ext>
-    </p:extLst>
-  </p:cSld>
-  <p:clrMapOvr>
-    <a:masterClrMapping/>
-  </p:clrMapOvr>
-</p:sld>
-</file>
-
 <file path=ppt/slides/slide9.xml><?xml version="1.0" encoding="utf-8"?>
 <p:sld xmlns:a="http://schemas.openxmlformats.org/drawingml/2006/main" xmlns:r="http://schemas.openxmlformats.org/officeDocument/2006/relationships" xmlns:p="http://schemas.openxmlformats.org/presentationml/2006/main">
   <p:cSld>
@@ -10878,7 +10843,7 @@
           <p:cNvPr id="2" name="Title 1">
             <a:extLst>
               <a:ext uri="{FF2B5EF4-FFF2-40B4-BE49-F238E27FC236}">
-                <a16:creationId xmlns:a16="http://schemas.microsoft.com/office/drawing/2014/main" id="{5F7E726E-6C94-44B6-9491-69A03180DCD8}"/>
+                <a16:creationId xmlns:a16="http://schemas.microsoft.com/office/drawing/2014/main" id="{B800E62F-782F-4ACF-883E-C01DCFC56AA2}"/>
               </a:ext>
             </a:extLst>
           </p:cNvPr>
@@ -10896,7 +10861,7 @@
           <a:p>
             <a:r>
               <a:rPr lang="en-GB" dirty="0"/>
-              <a:t>Meaningful choice</a:t>
+              <a:t>What are the games challenges?</a:t>
             </a:r>
           </a:p>
         </p:txBody>
@@ -10906,7 +10871,7 @@
           <p:cNvPr id="3" name="Content Placeholder 2">
             <a:extLst>
               <a:ext uri="{FF2B5EF4-FFF2-40B4-BE49-F238E27FC236}">
-                <a16:creationId xmlns:a16="http://schemas.microsoft.com/office/drawing/2014/main" id="{E11523FA-7486-49F6-971F-0DD6261F9F52}"/>
+                <a16:creationId xmlns:a16="http://schemas.microsoft.com/office/drawing/2014/main" id="{BC1716B1-6E25-4E8D-9760-7F764FFC262B}"/>
               </a:ext>
             </a:extLst>
           </p:cNvPr>
@@ -10919,17 +10884,76 @@
         </p:nvSpPr>
         <p:spPr/>
         <p:txBody>
-          <a:bodyPr/>
-          <a:lstStyle/>
-          <a:p>
-            <a:endParaRPr lang="en-GB"/>
+          <a:bodyPr>
+            <a:normAutofit/>
+          </a:bodyPr>
+          <a:lstStyle/>
+          <a:p>
+            <a:r>
+              <a:rPr lang="en-GB" sz="3200" dirty="0"/>
+              <a:t>Social</a:t>
+            </a:r>
+          </a:p>
+          <a:p>
+            <a:r>
+              <a:rPr lang="en-GB" sz="3200" dirty="0"/>
+              <a:t>Strategical</a:t>
+            </a:r>
+          </a:p>
+          <a:p>
+            <a:r>
+              <a:rPr lang="en-GB" sz="3200" dirty="0"/>
+              <a:t>Physical challenge</a:t>
+            </a:r>
+          </a:p>
+          <a:p>
+            <a:pPr lvl="1"/>
+            <a:r>
+              <a:rPr lang="en-GB" sz="3000" dirty="0"/>
+              <a:t>Twitch mechanic</a:t>
+            </a:r>
+          </a:p>
+        </p:txBody>
+      </p:sp>
+      <p:sp>
+        <p:nvSpPr>
+          <p:cNvPr id="4" name="TextBox 3">
+            <a:extLst>
+              <a:ext uri="{FF2B5EF4-FFF2-40B4-BE49-F238E27FC236}">
+                <a16:creationId xmlns:a16="http://schemas.microsoft.com/office/drawing/2014/main" id="{92D77B54-0290-4018-9D3E-40407F07D633}"/>
+              </a:ext>
+            </a:extLst>
+          </p:cNvPr>
+          <p:cNvSpPr txBox="1"/>
+          <p:nvPr/>
+        </p:nvSpPr>
+        <p:spPr>
+          <a:xfrm>
+            <a:off x="10610850" y="452718"/>
+            <a:ext cx="342900" cy="369332"/>
+          </a:xfrm>
+          <a:prstGeom prst="rect">
+            <a:avLst/>
+          </a:prstGeom>
+          <a:noFill/>
+        </p:spPr>
+        <p:txBody>
+          <a:bodyPr wrap="square" rtlCol="0">
+            <a:spAutoFit/>
+          </a:bodyPr>
+          <a:lstStyle/>
+          <a:p>
+            <a:r>
+              <a:rPr lang="en-GB" dirty="0"/>
+              <a:t>T</a:t>
+            </a:r>
           </a:p>
         </p:txBody>
       </p:sp>
     </p:spTree>
     <p:extLst>
       <p:ext uri="{BB962C8B-B14F-4D97-AF65-F5344CB8AC3E}">
-        <p14:creationId xmlns:p14="http://schemas.microsoft.com/office/powerpoint/2010/main" val="3446319247"/>
+        <p14:creationId xmlns:p14="http://schemas.microsoft.com/office/powerpoint/2010/main" val="1743628887"/>
       </p:ext>
     </p:extLst>
   </p:cSld>

</xml_diff>

<commit_message>
work on the presentation
</commit_message>
<xml_diff>
--- a/Presentations/Group 14 Pitch Beta.pptx
+++ b/Presentations/Group 14 Pitch Beta.pptx
@@ -5,7 +5,7 @@
     <p:sldMasterId id="2147483783" r:id="rId1"/>
   </p:sldMasterIdLst>
   <p:notesMasterIdLst>
-    <p:notesMasterId r:id="rId14"/>
+    <p:notesMasterId r:id="rId15"/>
   </p:notesMasterIdLst>
   <p:sldIdLst>
     <p:sldId id="256" r:id="rId2"/>
@@ -18,8 +18,9 @@
     <p:sldId id="266" r:id="rId9"/>
     <p:sldId id="259" r:id="rId10"/>
     <p:sldId id="280" r:id="rId11"/>
-    <p:sldId id="267" r:id="rId12"/>
-    <p:sldId id="268" r:id="rId13"/>
+    <p:sldId id="281" r:id="rId12"/>
+    <p:sldId id="267" r:id="rId13"/>
+    <p:sldId id="268" r:id="rId14"/>
   </p:sldIdLst>
   <p:sldSz cx="12192000" cy="6858000"/>
   <p:notesSz cx="6858000" cy="9144000"/>
@@ -1355,6 +1356,186 @@
 </p:notes>
 </file>
 
+<file path=ppt/notesSlides/notesSlide10.xml><?xml version="1.0" encoding="utf-8"?>
+<p:notes xmlns:a="http://schemas.openxmlformats.org/drawingml/2006/main" xmlns:r="http://schemas.openxmlformats.org/officeDocument/2006/relationships" xmlns:p="http://schemas.openxmlformats.org/presentationml/2006/main">
+  <p:cSld>
+    <p:spTree>
+      <p:nvGrpSpPr>
+        <p:cNvPr id="1" name=""/>
+        <p:cNvGrpSpPr/>
+        <p:nvPr/>
+      </p:nvGrpSpPr>
+      <p:grpSpPr>
+        <a:xfrm>
+          <a:off x="0" y="0"/>
+          <a:ext cx="0" cy="0"/>
+          <a:chOff x="0" y="0"/>
+          <a:chExt cx="0" cy="0"/>
+        </a:xfrm>
+      </p:grpSpPr>
+      <p:sp>
+        <p:nvSpPr>
+          <p:cNvPr id="2" name="Slide Image Placeholder 1"/>
+          <p:cNvSpPr>
+            <a:spLocks noGrp="1" noRot="1" noChangeAspect="1"/>
+          </p:cNvSpPr>
+          <p:nvPr>
+            <p:ph type="sldImg"/>
+          </p:nvPr>
+        </p:nvSpPr>
+        <p:spPr/>
+      </p:sp>
+      <p:sp>
+        <p:nvSpPr>
+          <p:cNvPr id="3" name="Notes Placeholder 2"/>
+          <p:cNvSpPr>
+            <a:spLocks noGrp="1"/>
+          </p:cNvSpPr>
+          <p:nvPr>
+            <p:ph type="body" idx="1"/>
+          </p:nvPr>
+        </p:nvSpPr>
+        <p:spPr/>
+        <p:txBody>
+          <a:bodyPr/>
+          <a:lstStyle/>
+          <a:p>
+            <a:r>
+              <a:rPr lang="en-GB" dirty="0"/>
+              <a:t>Improve the prototype based on player feedback</a:t>
+            </a:r>
+          </a:p>
+          <a:p>
+            <a:r>
+              <a:rPr lang="en-GB" dirty="0"/>
+              <a:t>Finish the art for the game</a:t>
+            </a:r>
+          </a:p>
+          <a:p>
+            <a:endParaRPr lang="en-GB" dirty="0"/>
+          </a:p>
+        </p:txBody>
+      </p:sp>
+      <p:sp>
+        <p:nvSpPr>
+          <p:cNvPr id="4" name="Slide Number Placeholder 3"/>
+          <p:cNvSpPr>
+            <a:spLocks noGrp="1"/>
+          </p:cNvSpPr>
+          <p:nvPr>
+            <p:ph type="sldNum" sz="quarter" idx="10"/>
+          </p:nvPr>
+        </p:nvSpPr>
+        <p:spPr/>
+        <p:txBody>
+          <a:bodyPr/>
+          <a:lstStyle/>
+          <a:p>
+            <a:fld id="{0FA91835-90FF-41E4-AF94-16E4E0C00F06}" type="slidenum">
+              <a:rPr lang="en-GB" smtClean="0"/>
+              <a:t>12</a:t>
+            </a:fld>
+            <a:endParaRPr lang="en-GB"/>
+          </a:p>
+        </p:txBody>
+      </p:sp>
+    </p:spTree>
+    <p:extLst>
+      <p:ext uri="{BB962C8B-B14F-4D97-AF65-F5344CB8AC3E}">
+        <p14:creationId xmlns:p14="http://schemas.microsoft.com/office/powerpoint/2010/main" val="4242832113"/>
+      </p:ext>
+    </p:extLst>
+  </p:cSld>
+  <p:clrMapOvr>
+    <a:masterClrMapping/>
+  </p:clrMapOvr>
+</p:notes>
+</file>
+
+<file path=ppt/notesSlides/notesSlide11.xml><?xml version="1.0" encoding="utf-8"?>
+<p:notes xmlns:a="http://schemas.openxmlformats.org/drawingml/2006/main" xmlns:r="http://schemas.openxmlformats.org/officeDocument/2006/relationships" xmlns:p="http://schemas.openxmlformats.org/presentationml/2006/main">
+  <p:cSld>
+    <p:spTree>
+      <p:nvGrpSpPr>
+        <p:cNvPr id="1" name=""/>
+        <p:cNvGrpSpPr/>
+        <p:nvPr/>
+      </p:nvGrpSpPr>
+      <p:grpSpPr>
+        <a:xfrm>
+          <a:off x="0" y="0"/>
+          <a:ext cx="0" cy="0"/>
+          <a:chOff x="0" y="0"/>
+          <a:chExt cx="0" cy="0"/>
+        </a:xfrm>
+      </p:grpSpPr>
+      <p:sp>
+        <p:nvSpPr>
+          <p:cNvPr id="2" name="Slide Image Placeholder 1"/>
+          <p:cNvSpPr>
+            <a:spLocks noGrp="1" noRot="1" noChangeAspect="1"/>
+          </p:cNvSpPr>
+          <p:nvPr>
+            <p:ph type="sldImg"/>
+          </p:nvPr>
+        </p:nvSpPr>
+        <p:spPr/>
+      </p:sp>
+      <p:sp>
+        <p:nvSpPr>
+          <p:cNvPr id="3" name="Notes Placeholder 2"/>
+          <p:cNvSpPr>
+            <a:spLocks noGrp="1"/>
+          </p:cNvSpPr>
+          <p:nvPr>
+            <p:ph type="body" idx="1"/>
+          </p:nvPr>
+        </p:nvSpPr>
+        <p:spPr/>
+        <p:txBody>
+          <a:bodyPr/>
+          <a:lstStyle/>
+          <a:p>
+            <a:endParaRPr lang="en-GB" dirty="0"/>
+          </a:p>
+        </p:txBody>
+      </p:sp>
+      <p:sp>
+        <p:nvSpPr>
+          <p:cNvPr id="4" name="Slide Number Placeholder 3"/>
+          <p:cNvSpPr>
+            <a:spLocks noGrp="1"/>
+          </p:cNvSpPr>
+          <p:nvPr>
+            <p:ph type="sldNum" sz="quarter" idx="10"/>
+          </p:nvPr>
+        </p:nvSpPr>
+        <p:spPr/>
+        <p:txBody>
+          <a:bodyPr/>
+          <a:lstStyle/>
+          <a:p>
+            <a:fld id="{0FA91835-90FF-41E4-AF94-16E4E0C00F06}" type="slidenum">
+              <a:rPr lang="en-GB" smtClean="0"/>
+              <a:t>13</a:t>
+            </a:fld>
+            <a:endParaRPr lang="en-GB"/>
+          </a:p>
+        </p:txBody>
+      </p:sp>
+    </p:spTree>
+    <p:extLst>
+      <p:ext uri="{BB962C8B-B14F-4D97-AF65-F5344CB8AC3E}">
+        <p14:creationId xmlns:p14="http://schemas.microsoft.com/office/powerpoint/2010/main" val="3745858853"/>
+      </p:ext>
+    </p:extLst>
+  </p:cSld>
+  <p:clrMapOvr>
+    <a:masterClrMapping/>
+  </p:clrMapOvr>
+</p:notes>
+</file>
+
 <file path=ppt/notesSlides/notesSlide2.xml><?xml version="1.0" encoding="utf-8"?>
 <p:notes xmlns:a="http://schemas.openxmlformats.org/drawingml/2006/main" xmlns:r="http://schemas.openxmlformats.org/officeDocument/2006/relationships" xmlns:p="http://schemas.openxmlformats.org/presentationml/2006/main">
   <p:cSld>
@@ -1399,7 +1580,16 @@
           <a:bodyPr/>
           <a:lstStyle/>
           <a:p>
-            <a:endParaRPr lang="en-GB" dirty="0"/>
+            <a:r>
+              <a:rPr lang="en-GB" dirty="0"/>
+              <a:t>These are the members of the demographic that we aim to tick the most boxes for; however, casual gamers can be either gender and any age.</a:t>
+            </a:r>
+          </a:p>
+          <a:p>
+            <a:r>
+              <a:rPr lang="en-GB" dirty="0"/>
+              <a:t>We have selected this specific proportion as the most likely marketed for this game.</a:t>
+            </a:r>
           </a:p>
         </p:txBody>
       </p:sp>
@@ -1981,18 +2171,6 @@
           <a:bodyPr/>
           <a:lstStyle/>
           <a:p>
-            <a:r>
-              <a:rPr lang="en-GB" dirty="0"/>
-              <a:t>Improve the prototype based on player feedback</a:t>
-            </a:r>
-          </a:p>
-          <a:p>
-            <a:r>
-              <a:rPr lang="en-GB" dirty="0"/>
-              <a:t>Finish the art for the game</a:t>
-            </a:r>
-          </a:p>
-          <a:p>
             <a:endParaRPr lang="en-GB" dirty="0"/>
           </a:p>
         </p:txBody>
@@ -2014,7 +2192,7 @@
           <a:p>
             <a:fld id="{0FA91835-90FF-41E4-AF94-16E4E0C00F06}" type="slidenum">
               <a:rPr lang="en-GB" smtClean="0"/>
-              <a:t>11</a:t>
+              <a:t>10</a:t>
             </a:fld>
             <a:endParaRPr lang="en-GB"/>
           </a:p>
@@ -2023,7 +2201,7 @@
     </p:spTree>
     <p:extLst>
       <p:ext uri="{BB962C8B-B14F-4D97-AF65-F5344CB8AC3E}">
-        <p14:creationId xmlns:p14="http://schemas.microsoft.com/office/powerpoint/2010/main" val="4242832113"/>
+        <p14:creationId xmlns:p14="http://schemas.microsoft.com/office/powerpoint/2010/main" val="1131234871"/>
       </p:ext>
     </p:extLst>
   </p:cSld>
@@ -2077,6 +2255,24 @@
           <a:bodyPr/>
           <a:lstStyle/>
           <a:p>
+            <a:r>
+              <a:rPr lang="en-GB" dirty="0"/>
+              <a:t>Removed the bridge as it was interrupting the screen</a:t>
+            </a:r>
+          </a:p>
+          <a:p>
+            <a:r>
+              <a:rPr lang="en-GB" dirty="0"/>
+              <a:t>Monochromatic colour palette for background</a:t>
+            </a:r>
+          </a:p>
+          <a:p>
+            <a:r>
+              <a:rPr lang="en-GB" dirty="0"/>
+              <a:t>High value, low saturation colours in comparison to the characters</a:t>
+            </a:r>
+          </a:p>
+          <a:p>
             <a:endParaRPr lang="en-GB" dirty="0"/>
           </a:p>
         </p:txBody>
@@ -2098,7 +2294,7 @@
           <a:p>
             <a:fld id="{0FA91835-90FF-41E4-AF94-16E4E0C00F06}" type="slidenum">
               <a:rPr lang="en-GB" smtClean="0"/>
-              <a:t>12</a:t>
+              <a:t>11</a:t>
             </a:fld>
             <a:endParaRPr lang="en-GB"/>
           </a:p>
@@ -2107,7 +2303,7 @@
     </p:spTree>
     <p:extLst>
       <p:ext uri="{BB962C8B-B14F-4D97-AF65-F5344CB8AC3E}">
-        <p14:creationId xmlns:p14="http://schemas.microsoft.com/office/powerpoint/2010/main" val="3745858853"/>
+        <p14:creationId xmlns:p14="http://schemas.microsoft.com/office/powerpoint/2010/main" val="656092623"/>
       </p:ext>
     </p:extLst>
   </p:cSld>
@@ -9210,36 +9406,83 @@
           <a:p>
             <a:r>
               <a:rPr lang="en-GB" dirty="0"/>
-              <a:t>Add in an art slide?</a:t>
-            </a:r>
-          </a:p>
-        </p:txBody>
-      </p:sp>
-      <p:sp>
-        <p:nvSpPr>
-          <p:cNvPr id="3" name="Content Placeholder 2">
+              <a:t>Art</a:t>
+            </a:r>
+          </a:p>
+        </p:txBody>
+      </p:sp>
+      <p:pic>
+        <p:nvPicPr>
+          <p:cNvPr id="7" name="Picture 6">
             <a:extLst>
               <a:ext uri="{FF2B5EF4-FFF2-40B4-BE49-F238E27FC236}">
-                <a16:creationId xmlns:a16="http://schemas.microsoft.com/office/drawing/2014/main" id="{63157644-4C55-4187-AB1C-ED6373C5F978}"/>
+                <a16:creationId xmlns:a16="http://schemas.microsoft.com/office/drawing/2014/main" id="{363CE471-ADC4-4460-86FB-F41A326BE32A}"/>
               </a:ext>
             </a:extLst>
           </p:cNvPr>
-          <p:cNvSpPr>
-            <a:spLocks noGrp="1"/>
-          </p:cNvSpPr>
-          <p:nvPr>
-            <p:ph idx="1"/>
-          </p:nvPr>
-        </p:nvSpPr>
-        <p:spPr/>
-        <p:txBody>
-          <a:bodyPr/>
-          <a:lstStyle/>
-          <a:p>
-            <a:endParaRPr lang="en-GB"/>
-          </a:p>
-        </p:txBody>
-      </p:sp>
+          <p:cNvPicPr>
+            <a:picLocks noChangeAspect="1"/>
+          </p:cNvPicPr>
+          <p:nvPr/>
+        </p:nvPicPr>
+        <p:blipFill>
+          <a:blip r:embed="rId3">
+            <a:extLst>
+              <a:ext uri="{28A0092B-C50C-407E-A947-70E740481C1C}">
+                <a14:useLocalDpi xmlns:a14="http://schemas.microsoft.com/office/drawing/2010/main" val="0"/>
+              </a:ext>
+            </a:extLst>
+          </a:blip>
+          <a:stretch>
+            <a:fillRect/>
+          </a:stretch>
+        </p:blipFill>
+        <p:spPr>
+          <a:xfrm>
+            <a:off x="1258827" y="1200586"/>
+            <a:ext cx="9404726" cy="5349301"/>
+          </a:xfrm>
+          <a:prstGeom prst="rect">
+            <a:avLst/>
+          </a:prstGeom>
+        </p:spPr>
+      </p:pic>
+      <p:pic>
+        <p:nvPicPr>
+          <p:cNvPr id="9" name="Picture 8">
+            <a:extLst>
+              <a:ext uri="{FF2B5EF4-FFF2-40B4-BE49-F238E27FC236}">
+                <a16:creationId xmlns:a16="http://schemas.microsoft.com/office/drawing/2014/main" id="{6E97A19F-8068-4FB5-9F24-638E73BB8997}"/>
+              </a:ext>
+            </a:extLst>
+          </p:cNvPr>
+          <p:cNvPicPr>
+            <a:picLocks noChangeAspect="1"/>
+          </p:cNvPicPr>
+          <p:nvPr/>
+        </p:nvPicPr>
+        <p:blipFill>
+          <a:blip r:embed="rId4">
+            <a:extLst>
+              <a:ext uri="{28A0092B-C50C-407E-A947-70E740481C1C}">
+                <a14:useLocalDpi xmlns:a14="http://schemas.microsoft.com/office/drawing/2010/main" val="0"/>
+              </a:ext>
+            </a:extLst>
+          </a:blip>
+          <a:stretch>
+            <a:fillRect/>
+          </a:stretch>
+        </p:blipFill>
+        <p:spPr>
+          <a:xfrm>
+            <a:off x="1258827" y="1200586"/>
+            <a:ext cx="9404726" cy="5349300"/>
+          </a:xfrm>
+          <a:prstGeom prst="rect">
+            <a:avLst/>
+          </a:prstGeom>
+        </p:spPr>
+      </p:pic>
     </p:spTree>
     <p:extLst>
       <p:ext uri="{BB962C8B-B14F-4D97-AF65-F5344CB8AC3E}">
@@ -9275,6 +9518,140 @@
           <p:cNvPr id="2" name="Title 1">
             <a:extLst>
               <a:ext uri="{FF2B5EF4-FFF2-40B4-BE49-F238E27FC236}">
+                <a16:creationId xmlns:a16="http://schemas.microsoft.com/office/drawing/2014/main" id="{05923386-0D5E-4A17-8B26-AD0E6C560286}"/>
+              </a:ext>
+            </a:extLst>
+          </p:cNvPr>
+          <p:cNvSpPr>
+            <a:spLocks noGrp="1"/>
+          </p:cNvSpPr>
+          <p:nvPr>
+            <p:ph type="title"/>
+          </p:nvPr>
+        </p:nvSpPr>
+        <p:spPr/>
+        <p:txBody>
+          <a:bodyPr/>
+          <a:lstStyle/>
+          <a:p>
+            <a:r>
+              <a:rPr lang="en-GB" dirty="0"/>
+              <a:t>Art</a:t>
+            </a:r>
+            <a:br>
+              <a:rPr lang="en-GB" dirty="0"/>
+            </a:br>
+            <a:endParaRPr lang="en-GB" dirty="0"/>
+          </a:p>
+        </p:txBody>
+      </p:sp>
+      <p:pic>
+        <p:nvPicPr>
+          <p:cNvPr id="8" name="Picture 7">
+            <a:extLst>
+              <a:ext uri="{FF2B5EF4-FFF2-40B4-BE49-F238E27FC236}">
+                <a16:creationId xmlns:a16="http://schemas.microsoft.com/office/drawing/2014/main" id="{CF65BBCE-F61E-4B0B-9534-2E02B1130917}"/>
+              </a:ext>
+            </a:extLst>
+          </p:cNvPr>
+          <p:cNvPicPr>
+            <a:picLocks noChangeAspect="1"/>
+          </p:cNvPicPr>
+          <p:nvPr/>
+        </p:nvPicPr>
+        <p:blipFill>
+          <a:blip r:embed="rId3">
+            <a:extLst>
+              <a:ext uri="{28A0092B-C50C-407E-A947-70E740481C1C}">
+                <a14:useLocalDpi xmlns:a14="http://schemas.microsoft.com/office/drawing/2010/main" val="0"/>
+              </a:ext>
+            </a:extLst>
+          </a:blip>
+          <a:stretch>
+            <a:fillRect/>
+          </a:stretch>
+        </p:blipFill>
+        <p:spPr>
+          <a:xfrm>
+            <a:off x="1258827" y="1200585"/>
+            <a:ext cx="9404723" cy="5349298"/>
+          </a:xfrm>
+          <a:prstGeom prst="rect">
+            <a:avLst/>
+          </a:prstGeom>
+        </p:spPr>
+      </p:pic>
+      <p:pic>
+        <p:nvPicPr>
+          <p:cNvPr id="9" name="Picture 8">
+            <a:extLst>
+              <a:ext uri="{FF2B5EF4-FFF2-40B4-BE49-F238E27FC236}">
+                <a16:creationId xmlns:a16="http://schemas.microsoft.com/office/drawing/2014/main" id="{D7D6E79F-2893-48C4-9F11-534DB4C6D052}"/>
+              </a:ext>
+            </a:extLst>
+          </p:cNvPr>
+          <p:cNvPicPr>
+            <a:picLocks noChangeAspect="1"/>
+          </p:cNvPicPr>
+          <p:nvPr/>
+        </p:nvPicPr>
+        <p:blipFill>
+          <a:blip r:embed="rId4">
+            <a:extLst>
+              <a:ext uri="{28A0092B-C50C-407E-A947-70E740481C1C}">
+                <a14:useLocalDpi xmlns:a14="http://schemas.microsoft.com/office/drawing/2010/main" val="0"/>
+              </a:ext>
+            </a:extLst>
+          </a:blip>
+          <a:stretch>
+            <a:fillRect/>
+          </a:stretch>
+        </p:blipFill>
+        <p:spPr>
+          <a:xfrm>
+            <a:off x="1258827" y="1200586"/>
+            <a:ext cx="9404726" cy="5349300"/>
+          </a:xfrm>
+          <a:prstGeom prst="rect">
+            <a:avLst/>
+          </a:prstGeom>
+        </p:spPr>
+      </p:pic>
+    </p:spTree>
+    <p:extLst>
+      <p:ext uri="{BB962C8B-B14F-4D97-AF65-F5344CB8AC3E}">
+        <p14:creationId xmlns:p14="http://schemas.microsoft.com/office/powerpoint/2010/main" val="2348737203"/>
+      </p:ext>
+    </p:extLst>
+  </p:cSld>
+  <p:clrMapOvr>
+    <a:masterClrMapping/>
+  </p:clrMapOvr>
+</p:sld>
+</file>
+
+<file path=ppt/slides/slide12.xml><?xml version="1.0" encoding="utf-8"?>
+<p:sld xmlns:a="http://schemas.openxmlformats.org/drawingml/2006/main" xmlns:r="http://schemas.openxmlformats.org/officeDocument/2006/relationships" xmlns:p="http://schemas.openxmlformats.org/presentationml/2006/main">
+  <p:cSld>
+    <p:spTree>
+      <p:nvGrpSpPr>
+        <p:cNvPr id="1" name=""/>
+        <p:cNvGrpSpPr/>
+        <p:nvPr/>
+      </p:nvGrpSpPr>
+      <p:grpSpPr>
+        <a:xfrm>
+          <a:off x="0" y="0"/>
+          <a:ext cx="0" cy="0"/>
+          <a:chOff x="0" y="0"/>
+          <a:chExt cx="0" cy="0"/>
+        </a:xfrm>
+      </p:grpSpPr>
+      <p:sp>
+        <p:nvSpPr>
+          <p:cNvPr id="2" name="Title 1">
+            <a:extLst>
+              <a:ext uri="{FF2B5EF4-FFF2-40B4-BE49-F238E27FC236}">
                 <a16:creationId xmlns:a16="http://schemas.microsoft.com/office/drawing/2014/main" id="{884D9554-1741-4629-B62D-1C02996DE221}"/>
               </a:ext>
             </a:extLst>
@@ -9418,7 +9795,7 @@
 </p:sld>
 </file>
 
-<file path=ppt/slides/slide12.xml><?xml version="1.0" encoding="utf-8"?>
+<file path=ppt/slides/slide13.xml><?xml version="1.0" encoding="utf-8"?>
 <p:sld xmlns:a="http://schemas.openxmlformats.org/drawingml/2006/main" xmlns:r="http://schemas.openxmlformats.org/officeDocument/2006/relationships" xmlns:p="http://schemas.openxmlformats.org/presentationml/2006/main">
   <p:cSld>
     <p:spTree>

</xml_diff>